<commit_message>
consistent interim meeting naming
</commit_message>
<xml_diff>
--- a/121/nmop-chairs-slides-session-1.pptx
+++ b/121/nmop-chairs-slides-session-1.pptx
@@ -282,6 +282,171 @@
 <file path=ppt/changesInfos/changesInfo1.xml><?xml version="1.0" encoding="utf-8"?>
 <pc:chgInfo xmlns:a="http://schemas.openxmlformats.org/drawingml/2006/main" xmlns:r="http://schemas.openxmlformats.org/officeDocument/2006/relationships" xmlns:ac="http://schemas.microsoft.com/office/drawing/2013/main/command" xmlns:pc="http://schemas.microsoft.com/office/powerpoint/2013/main/command">
   <pc:docChgLst>
+    <pc:chgData name="BOUCADAIR Mohamed INNOV/NET" userId="2acbca90-6db1-4111-98c4-832797dda751" providerId="ADAL" clId="{5E7AF159-790E-476D-B646-0EA162FC4C56}"/>
+    <pc:docChg chg="custSel modSld">
+      <pc:chgData name="BOUCADAIR Mohamed INNOV/NET" userId="2acbca90-6db1-4111-98c4-832797dda751" providerId="ADAL" clId="{5E7AF159-790E-476D-B646-0EA162FC4C56}" dt="2024-07-25T10:31:23.642" v="34" actId="207"/>
+      <pc:docMkLst>
+        <pc:docMk/>
+      </pc:docMkLst>
+      <pc:sldChg chg="addSp delSp modSp mod">
+        <pc:chgData name="BOUCADAIR Mohamed INNOV/NET" userId="2acbca90-6db1-4111-98c4-832797dda751" providerId="ADAL" clId="{5E7AF159-790E-476D-B646-0EA162FC4C56}" dt="2024-07-25T10:31:23.642" v="34" actId="207"/>
+        <pc:sldMkLst>
+          <pc:docMk/>
+          <pc:sldMk cId="513082138" sldId="271"/>
+        </pc:sldMkLst>
+        <pc:spChg chg="add del mod">
+          <ac:chgData name="BOUCADAIR Mohamed INNOV/NET" userId="2acbca90-6db1-4111-98c4-832797dda751" providerId="ADAL" clId="{5E7AF159-790E-476D-B646-0EA162FC4C56}" dt="2024-07-25T10:30:18.251" v="6" actId="478"/>
+          <ac:spMkLst>
+            <pc:docMk/>
+            <pc:sldMk cId="513082138" sldId="271"/>
+            <ac:spMk id="7" creationId="{959513DF-7598-B39D-5374-43A00E7C1D11}"/>
+          </ac:spMkLst>
+        </pc:spChg>
+        <pc:spChg chg="add mod">
+          <ac:chgData name="BOUCADAIR Mohamed INNOV/NET" userId="2acbca90-6db1-4111-98c4-832797dda751" providerId="ADAL" clId="{5E7AF159-790E-476D-B646-0EA162FC4C56}" dt="2024-07-25T10:31:06.040" v="19" actId="14100"/>
+          <ac:spMkLst>
+            <pc:docMk/>
+            <pc:sldMk cId="513082138" sldId="271"/>
+            <ac:spMk id="8" creationId="{5DFD05E8-7913-434C-25CA-289688FED3CE}"/>
+          </ac:spMkLst>
+        </pc:spChg>
+        <pc:spChg chg="add mod">
+          <ac:chgData name="BOUCADAIR Mohamed INNOV/NET" userId="2acbca90-6db1-4111-98c4-832797dda751" providerId="ADAL" clId="{5E7AF159-790E-476D-B646-0EA162FC4C56}" dt="2024-07-25T10:31:23.642" v="34" actId="207"/>
+          <ac:spMkLst>
+            <pc:docMk/>
+            <pc:sldMk cId="513082138" sldId="271"/>
+            <ac:spMk id="9" creationId="{2328023F-1C93-51F0-A761-742333E90631}"/>
+          </ac:spMkLst>
+        </pc:spChg>
+        <pc:picChg chg="add mod">
+          <ac:chgData name="BOUCADAIR Mohamed INNOV/NET" userId="2acbca90-6db1-4111-98c4-832797dda751" providerId="ADAL" clId="{5E7AF159-790E-476D-B646-0EA162FC4C56}" dt="2024-07-25T10:29:41.283" v="2" actId="1076"/>
+          <ac:picMkLst>
+            <pc:docMk/>
+            <pc:sldMk cId="513082138" sldId="271"/>
+            <ac:picMk id="5" creationId="{AF5338B3-82EF-B6E1-3E64-A69B18A3C63B}"/>
+          </ac:picMkLst>
+        </pc:picChg>
+        <pc:picChg chg="del">
+          <ac:chgData name="BOUCADAIR Mohamed INNOV/NET" userId="2acbca90-6db1-4111-98c4-832797dda751" providerId="ADAL" clId="{5E7AF159-790E-476D-B646-0EA162FC4C56}" dt="2024-07-25T10:29:38.004" v="0" actId="478"/>
+          <ac:picMkLst>
+            <pc:docMk/>
+            <pc:sldMk cId="513082138" sldId="271"/>
+            <ac:picMk id="6" creationId="{12D77918-8ECB-6E5D-0965-E81951B65AA8}"/>
+          </ac:picMkLst>
+        </pc:picChg>
+      </pc:sldChg>
+    </pc:docChg>
+  </pc:docChgLst>
+  <pc:docChgLst>
+    <pc:chgData name="BOUCADAIR Mohamed INNOV/NET" userId="2acbca90-6db1-4111-98c4-832797dda751" providerId="ADAL" clId="{59F6FDA4-2B5F-4B5B-B88E-9904D84ED0E1}"/>
+    <pc:docChg chg="custSel addSld delSld modSld">
+      <pc:chgData name="BOUCADAIR Mohamed INNOV/NET" userId="2acbca90-6db1-4111-98c4-832797dda751" providerId="ADAL" clId="{59F6FDA4-2B5F-4B5B-B88E-9904D84ED0E1}" dt="2024-07-25T10:26:57.628" v="582" actId="6549"/>
+      <pc:docMkLst>
+        <pc:docMk/>
+      </pc:docMkLst>
+      <pc:sldChg chg="modSp mod">
+        <pc:chgData name="BOUCADAIR Mohamed INNOV/NET" userId="2acbca90-6db1-4111-98c4-832797dda751" providerId="ADAL" clId="{59F6FDA4-2B5F-4B5B-B88E-9904D84ED0E1}" dt="2024-07-25T10:26:57.628" v="582" actId="6549"/>
+        <pc:sldMkLst>
+          <pc:docMk/>
+          <pc:sldMk cId="2749868532" sldId="268"/>
+        </pc:sldMkLst>
+        <pc:spChg chg="mod">
+          <ac:chgData name="BOUCADAIR Mohamed INNOV/NET" userId="2acbca90-6db1-4111-98c4-832797dda751" providerId="ADAL" clId="{59F6FDA4-2B5F-4B5B-B88E-9904D84ED0E1}" dt="2024-07-25T10:26:57.628" v="582" actId="6549"/>
+          <ac:spMkLst>
+            <pc:docMk/>
+            <pc:sldMk cId="2749868532" sldId="268"/>
+            <ac:spMk id="9" creationId="{BB4F778F-8939-B422-821F-330027B1D08E}"/>
+          </ac:spMkLst>
+        </pc:spChg>
+      </pc:sldChg>
+      <pc:sldChg chg="addSp modSp mod">
+        <pc:chgData name="BOUCADAIR Mohamed INNOV/NET" userId="2acbca90-6db1-4111-98c4-832797dda751" providerId="ADAL" clId="{59F6FDA4-2B5F-4B5B-B88E-9904D84ED0E1}" dt="2024-07-25T10:26:22.246" v="567"/>
+        <pc:sldMkLst>
+          <pc:docMk/>
+          <pc:sldMk cId="3664032414" sldId="270"/>
+        </pc:sldMkLst>
+        <pc:spChg chg="add mod">
+          <ac:chgData name="BOUCADAIR Mohamed INNOV/NET" userId="2acbca90-6db1-4111-98c4-832797dda751" providerId="ADAL" clId="{59F6FDA4-2B5F-4B5B-B88E-9904D84ED0E1}" dt="2024-07-25T10:26:22.246" v="567"/>
+          <ac:spMkLst>
+            <pc:docMk/>
+            <pc:sldMk cId="3664032414" sldId="270"/>
+            <ac:spMk id="3" creationId="{FB0EA3CF-BB8A-1C4E-7A3A-DC28DBA68DD9}"/>
+          </ac:spMkLst>
+        </pc:spChg>
+      </pc:sldChg>
+      <pc:sldChg chg="modSp mod">
+        <pc:chgData name="BOUCADAIR Mohamed INNOV/NET" userId="2acbca90-6db1-4111-98c4-832797dda751" providerId="ADAL" clId="{59F6FDA4-2B5F-4B5B-B88E-9904D84ED0E1}" dt="2024-07-25T10:26:31.140" v="569"/>
+        <pc:sldMkLst>
+          <pc:docMk/>
+          <pc:sldMk cId="514278596" sldId="274"/>
+        </pc:sldMkLst>
+        <pc:spChg chg="mod">
+          <ac:chgData name="BOUCADAIR Mohamed INNOV/NET" userId="2acbca90-6db1-4111-98c4-832797dda751" providerId="ADAL" clId="{59F6FDA4-2B5F-4B5B-B88E-9904D84ED0E1}" dt="2024-07-25T10:26:31.140" v="569"/>
+          <ac:spMkLst>
+            <pc:docMk/>
+            <pc:sldMk cId="514278596" sldId="274"/>
+            <ac:spMk id="5" creationId="{3856129A-94B9-0425-E3E2-66E6DE494147}"/>
+          </ac:spMkLst>
+        </pc:spChg>
+      </pc:sldChg>
+      <pc:sldChg chg="addSp delSp modSp new del mod">
+        <pc:chgData name="BOUCADAIR Mohamed INNOV/NET" userId="2acbca90-6db1-4111-98c4-832797dda751" providerId="ADAL" clId="{59F6FDA4-2B5F-4B5B-B88E-9904D84ED0E1}" dt="2024-07-25T10:24:29.805" v="528" actId="47"/>
+        <pc:sldMkLst>
+          <pc:docMk/>
+          <pc:sldMk cId="1210538029" sldId="276"/>
+        </pc:sldMkLst>
+        <pc:spChg chg="mod">
+          <ac:chgData name="BOUCADAIR Mohamed INNOV/NET" userId="2acbca90-6db1-4111-98c4-832797dda751" providerId="ADAL" clId="{59F6FDA4-2B5F-4B5B-B88E-9904D84ED0E1}" dt="2024-07-25T10:22:05.753" v="475" actId="20577"/>
+          <ac:spMkLst>
+            <pc:docMk/>
+            <pc:sldMk cId="1210538029" sldId="276"/>
+            <ac:spMk id="2" creationId="{8D0A9E63-A403-35AB-D257-445F2EB3A880}"/>
+          </ac:spMkLst>
+        </pc:spChg>
+        <pc:spChg chg="del">
+          <ac:chgData name="BOUCADAIR Mohamed INNOV/NET" userId="2acbca90-6db1-4111-98c4-832797dda751" providerId="ADAL" clId="{59F6FDA4-2B5F-4B5B-B88E-9904D84ED0E1}" dt="2024-07-25T10:21:46.178" v="467" actId="478"/>
+          <ac:spMkLst>
+            <pc:docMk/>
+            <pc:sldMk cId="1210538029" sldId="276"/>
+            <ac:spMk id="3" creationId="{63CE1D58-85E9-DF46-42CD-DDE5467A2C8D}"/>
+          </ac:spMkLst>
+        </pc:spChg>
+        <pc:spChg chg="add mod">
+          <ac:chgData name="BOUCADAIR Mohamed INNOV/NET" userId="2acbca90-6db1-4111-98c4-832797dda751" providerId="ADAL" clId="{59F6FDA4-2B5F-4B5B-B88E-9904D84ED0E1}" dt="2024-07-25T10:22:39.318" v="482" actId="208"/>
+          <ac:spMkLst>
+            <pc:docMk/>
+            <pc:sldMk cId="1210538029" sldId="276"/>
+            <ac:spMk id="7" creationId="{D1B45DFC-0642-CD92-0761-37A3232DD028}"/>
+          </ac:spMkLst>
+        </pc:spChg>
+        <pc:spChg chg="add mod">
+          <ac:chgData name="BOUCADAIR Mohamed INNOV/NET" userId="2acbca90-6db1-4111-98c4-832797dda751" providerId="ADAL" clId="{59F6FDA4-2B5F-4B5B-B88E-9904D84ED0E1}" dt="2024-07-25T10:22:45.686" v="483" actId="1076"/>
+          <ac:spMkLst>
+            <pc:docMk/>
+            <pc:sldMk cId="1210538029" sldId="276"/>
+            <ac:spMk id="8" creationId="{322AA1CE-42C4-221C-C03C-3ADDE5E9428A}"/>
+          </ac:spMkLst>
+        </pc:spChg>
+        <pc:spChg chg="add mod">
+          <ac:chgData name="BOUCADAIR Mohamed INNOV/NET" userId="2acbca90-6db1-4111-98c4-832797dda751" providerId="ADAL" clId="{59F6FDA4-2B5F-4B5B-B88E-9904D84ED0E1}" dt="2024-07-25T10:24:21.471" v="527" actId="14100"/>
+          <ac:spMkLst>
+            <pc:docMk/>
+            <pc:sldMk cId="1210538029" sldId="276"/>
+            <ac:spMk id="9" creationId="{AE3EC158-B6C2-83CD-C9E4-0C689DEC06B5}"/>
+          </ac:spMkLst>
+        </pc:spChg>
+        <pc:picChg chg="add mod">
+          <ac:chgData name="BOUCADAIR Mohamed INNOV/NET" userId="2acbca90-6db1-4111-98c4-832797dda751" providerId="ADAL" clId="{59F6FDA4-2B5F-4B5B-B88E-9904D84ED0E1}" dt="2024-07-25T10:22:03.394" v="473" actId="1076"/>
+          <ac:picMkLst>
+            <pc:docMk/>
+            <pc:sldMk cId="1210538029" sldId="276"/>
+            <ac:picMk id="6" creationId="{841BE516-3EF8-8CC1-7182-2872E92DC3D4}"/>
+          </ac:picMkLst>
+        </pc:picChg>
+      </pc:sldChg>
+    </pc:docChg>
+  </pc:docChgLst>
+  <pc:docChgLst>
     <pc:chgData name="BOUCADAIR Mohamed INNOV/NET" userId="2acbca90-6db1-4111-98c4-832797dda751" providerId="ADAL" clId="{40AA09E1-26BA-45C8-8F45-A3257F5F94CD}"/>
     <pc:docChg chg="addSld modSld">
       <pc:chgData name="BOUCADAIR Mohamed INNOV/NET" userId="2acbca90-6db1-4111-98c4-832797dda751" providerId="ADAL" clId="{40AA09E1-26BA-45C8-8F45-A3257F5F94CD}" dt="2024-07-26T16:49:37.571" v="94" actId="207"/>
@@ -346,93 +511,6 @@
             <pc:docMk/>
             <pc:sldMk cId="482176988" sldId="278"/>
             <ac:spMk id="3" creationId="{354D1E93-08D4-7AF9-1B2D-B84F0A60F806}"/>
-          </ac:spMkLst>
-        </pc:spChg>
-      </pc:sldChg>
-    </pc:docChg>
-  </pc:docChgLst>
-  <pc:docChgLst>
-    <pc:chgData name="BOUCADAIR Mohamed INNOV/NET" userId="2acbca90-6db1-4111-98c4-832797dda751" providerId="ADAL" clId="{D2F81640-DBF7-4596-A85C-8BBE2BAACBF2}"/>
-    <pc:docChg chg="custSel modSld">
-      <pc:chgData name="BOUCADAIR Mohamed INNOV/NET" userId="2acbca90-6db1-4111-98c4-832797dda751" providerId="ADAL" clId="{D2F81640-DBF7-4596-A85C-8BBE2BAACBF2}" dt="2024-07-16T10:18:13.267" v="236" actId="20577"/>
-      <pc:docMkLst>
-        <pc:docMk/>
-      </pc:docMkLst>
-      <pc:sldChg chg="addSp delSp modSp mod">
-        <pc:chgData name="BOUCADAIR Mohamed INNOV/NET" userId="2acbca90-6db1-4111-98c4-832797dda751" providerId="ADAL" clId="{D2F81640-DBF7-4596-A85C-8BBE2BAACBF2}" dt="2024-07-16T10:15:03.546" v="116" actId="207"/>
-        <pc:sldMkLst>
-          <pc:docMk/>
-          <pc:sldMk cId="19349701" sldId="263"/>
-        </pc:sldMkLst>
-        <pc:spChg chg="mod">
-          <ac:chgData name="BOUCADAIR Mohamed INNOV/NET" userId="2acbca90-6db1-4111-98c4-832797dda751" providerId="ADAL" clId="{D2F81640-DBF7-4596-A85C-8BBE2BAACBF2}" dt="2024-07-16T10:13:55.185" v="81" actId="1076"/>
-          <ac:spMkLst>
-            <pc:docMk/>
-            <pc:sldMk cId="19349701" sldId="263"/>
-            <ac:spMk id="3" creationId="{83D20BE9-2246-7E23-23A9-3B3575F16427}"/>
-          </ac:spMkLst>
-        </pc:spChg>
-        <pc:spChg chg="add del mod">
-          <ac:chgData name="BOUCADAIR Mohamed INNOV/NET" userId="2acbca90-6db1-4111-98c4-832797dda751" providerId="ADAL" clId="{D2F81640-DBF7-4596-A85C-8BBE2BAACBF2}" dt="2024-07-16T10:12:38.365" v="43" actId="478"/>
-          <ac:spMkLst>
-            <pc:docMk/>
-            <pc:sldMk cId="19349701" sldId="263"/>
-            <ac:spMk id="5" creationId="{D704E20F-8DE7-83C2-C8DB-53E580978B4E}"/>
-          </ac:spMkLst>
-        </pc:spChg>
-        <pc:spChg chg="add mod">
-          <ac:chgData name="BOUCADAIR Mohamed INNOV/NET" userId="2acbca90-6db1-4111-98c4-832797dda751" providerId="ADAL" clId="{D2F81640-DBF7-4596-A85C-8BBE2BAACBF2}" dt="2024-07-16T10:14:40.571" v="113" actId="207"/>
-          <ac:spMkLst>
-            <pc:docMk/>
-            <pc:sldMk cId="19349701" sldId="263"/>
-            <ac:spMk id="6" creationId="{BCA2001A-51BF-45CB-C2B7-BB9B0CA4A33D}"/>
-          </ac:spMkLst>
-        </pc:spChg>
-        <pc:spChg chg="add mod ord">
-          <ac:chgData name="BOUCADAIR Mohamed INNOV/NET" userId="2acbca90-6db1-4111-98c4-832797dda751" providerId="ADAL" clId="{D2F81640-DBF7-4596-A85C-8BBE2BAACBF2}" dt="2024-07-16T10:14:05.825" v="108" actId="1037"/>
-          <ac:spMkLst>
-            <pc:docMk/>
-            <pc:sldMk cId="19349701" sldId="263"/>
-            <ac:spMk id="7" creationId="{2B7E25EF-AEAB-D46F-394B-F805E54DA742}"/>
-          </ac:spMkLst>
-        </pc:spChg>
-        <pc:spChg chg="add mod">
-          <ac:chgData name="BOUCADAIR Mohamed INNOV/NET" userId="2acbca90-6db1-4111-98c4-832797dda751" providerId="ADAL" clId="{D2F81640-DBF7-4596-A85C-8BBE2BAACBF2}" dt="2024-07-16T10:15:03.546" v="116" actId="207"/>
-          <ac:spMkLst>
-            <pc:docMk/>
-            <pc:sldMk cId="19349701" sldId="263"/>
-            <ac:spMk id="8" creationId="{43CBEF85-868C-DB6D-8E15-BC44095515A0}"/>
-          </ac:spMkLst>
-        </pc:spChg>
-      </pc:sldChg>
-      <pc:sldChg chg="addSp delSp modSp mod">
-        <pc:chgData name="BOUCADAIR Mohamed INNOV/NET" userId="2acbca90-6db1-4111-98c4-832797dda751" providerId="ADAL" clId="{D2F81640-DBF7-4596-A85C-8BBE2BAACBF2}" dt="2024-07-16T10:18:13.267" v="236" actId="20577"/>
-        <pc:sldMkLst>
-          <pc:docMk/>
-          <pc:sldMk cId="514278596" sldId="274"/>
-        </pc:sldMkLst>
-        <pc:spChg chg="mod">
-          <ac:chgData name="BOUCADAIR Mohamed INNOV/NET" userId="2acbca90-6db1-4111-98c4-832797dda751" providerId="ADAL" clId="{D2F81640-DBF7-4596-A85C-8BBE2BAACBF2}" dt="2024-07-16T10:18:13.267" v="236" actId="20577"/>
-          <ac:spMkLst>
-            <pc:docMk/>
-            <pc:sldMk cId="514278596" sldId="274"/>
-            <ac:spMk id="5" creationId="{3856129A-94B9-0425-E3E2-66E6DE494147}"/>
-          </ac:spMkLst>
-        </pc:spChg>
-        <pc:spChg chg="add del mod">
-          <ac:chgData name="BOUCADAIR Mohamed INNOV/NET" userId="2acbca90-6db1-4111-98c4-832797dda751" providerId="ADAL" clId="{D2F81640-DBF7-4596-A85C-8BBE2BAACBF2}" dt="2024-07-16T10:17:47.377" v="230" actId="478"/>
-          <ac:spMkLst>
-            <pc:docMk/>
-            <pc:sldMk cId="514278596" sldId="274"/>
-            <ac:spMk id="6" creationId="{2AF546A0-30B2-8592-4398-B35176E22E58}"/>
-          </ac:spMkLst>
-        </pc:spChg>
-        <pc:spChg chg="add del mod">
-          <ac:chgData name="BOUCADAIR Mohamed INNOV/NET" userId="2acbca90-6db1-4111-98c4-832797dda751" providerId="ADAL" clId="{D2F81640-DBF7-4596-A85C-8BBE2BAACBF2}" dt="2024-07-16T10:17:49.657" v="231" actId="478"/>
-          <ac:spMkLst>
-            <pc:docMk/>
-            <pc:sldMk cId="514278596" sldId="274"/>
-            <ac:spMk id="7" creationId="{DCD64453-FCEB-586A-5A4E-B232DB3AEA38}"/>
           </ac:spMkLst>
         </pc:spChg>
       </pc:sldChg>
@@ -943,163 +1021,87 @@
     </pc:docChg>
   </pc:docChgLst>
   <pc:docChgLst>
-    <pc:chgData name="BOUCADAIR Mohamed INNOV/NET" userId="2acbca90-6db1-4111-98c4-832797dda751" providerId="ADAL" clId="{59F6FDA4-2B5F-4B5B-B88E-9904D84ED0E1}"/>
-    <pc:docChg chg="custSel addSld delSld modSld">
-      <pc:chgData name="BOUCADAIR Mohamed INNOV/NET" userId="2acbca90-6db1-4111-98c4-832797dda751" providerId="ADAL" clId="{59F6FDA4-2B5F-4B5B-B88E-9904D84ED0E1}" dt="2024-07-25T10:26:57.628" v="582" actId="6549"/>
+    <pc:chgData name="BOUCADAIR Mohamed INNOV/NET" userId="2acbca90-6db1-4111-98c4-832797dda751" providerId="ADAL" clId="{D2F81640-DBF7-4596-A85C-8BBE2BAACBF2}"/>
+    <pc:docChg chg="custSel modSld">
+      <pc:chgData name="BOUCADAIR Mohamed INNOV/NET" userId="2acbca90-6db1-4111-98c4-832797dda751" providerId="ADAL" clId="{D2F81640-DBF7-4596-A85C-8BBE2BAACBF2}" dt="2024-07-16T10:18:13.267" v="236" actId="20577"/>
       <pc:docMkLst>
         <pc:docMk/>
       </pc:docMkLst>
-      <pc:sldChg chg="modSp mod">
-        <pc:chgData name="BOUCADAIR Mohamed INNOV/NET" userId="2acbca90-6db1-4111-98c4-832797dda751" providerId="ADAL" clId="{59F6FDA4-2B5F-4B5B-B88E-9904D84ED0E1}" dt="2024-07-25T10:26:57.628" v="582" actId="6549"/>
+      <pc:sldChg chg="addSp delSp modSp mod">
+        <pc:chgData name="BOUCADAIR Mohamed INNOV/NET" userId="2acbca90-6db1-4111-98c4-832797dda751" providerId="ADAL" clId="{D2F81640-DBF7-4596-A85C-8BBE2BAACBF2}" dt="2024-07-16T10:15:03.546" v="116" actId="207"/>
         <pc:sldMkLst>
           <pc:docMk/>
-          <pc:sldMk cId="2749868532" sldId="268"/>
+          <pc:sldMk cId="19349701" sldId="263"/>
         </pc:sldMkLst>
         <pc:spChg chg="mod">
-          <ac:chgData name="BOUCADAIR Mohamed INNOV/NET" userId="2acbca90-6db1-4111-98c4-832797dda751" providerId="ADAL" clId="{59F6FDA4-2B5F-4B5B-B88E-9904D84ED0E1}" dt="2024-07-25T10:26:57.628" v="582" actId="6549"/>
+          <ac:chgData name="BOUCADAIR Mohamed INNOV/NET" userId="2acbca90-6db1-4111-98c4-832797dda751" providerId="ADAL" clId="{D2F81640-DBF7-4596-A85C-8BBE2BAACBF2}" dt="2024-07-16T10:13:55.185" v="81" actId="1076"/>
           <ac:spMkLst>
             <pc:docMk/>
-            <pc:sldMk cId="2749868532" sldId="268"/>
-            <ac:spMk id="9" creationId="{BB4F778F-8939-B422-821F-330027B1D08E}"/>
+            <pc:sldMk cId="19349701" sldId="263"/>
+            <ac:spMk id="3" creationId="{83D20BE9-2246-7E23-23A9-3B3575F16427}"/>
+          </ac:spMkLst>
+        </pc:spChg>
+        <pc:spChg chg="add del mod">
+          <ac:chgData name="BOUCADAIR Mohamed INNOV/NET" userId="2acbca90-6db1-4111-98c4-832797dda751" providerId="ADAL" clId="{D2F81640-DBF7-4596-A85C-8BBE2BAACBF2}" dt="2024-07-16T10:12:38.365" v="43" actId="478"/>
+          <ac:spMkLst>
+            <pc:docMk/>
+            <pc:sldMk cId="19349701" sldId="263"/>
+            <ac:spMk id="5" creationId="{D704E20F-8DE7-83C2-C8DB-53E580978B4E}"/>
+          </ac:spMkLst>
+        </pc:spChg>
+        <pc:spChg chg="add mod">
+          <ac:chgData name="BOUCADAIR Mohamed INNOV/NET" userId="2acbca90-6db1-4111-98c4-832797dda751" providerId="ADAL" clId="{D2F81640-DBF7-4596-A85C-8BBE2BAACBF2}" dt="2024-07-16T10:14:40.571" v="113" actId="207"/>
+          <ac:spMkLst>
+            <pc:docMk/>
+            <pc:sldMk cId="19349701" sldId="263"/>
+            <ac:spMk id="6" creationId="{BCA2001A-51BF-45CB-C2B7-BB9B0CA4A33D}"/>
+          </ac:spMkLst>
+        </pc:spChg>
+        <pc:spChg chg="add mod ord">
+          <ac:chgData name="BOUCADAIR Mohamed INNOV/NET" userId="2acbca90-6db1-4111-98c4-832797dda751" providerId="ADAL" clId="{D2F81640-DBF7-4596-A85C-8BBE2BAACBF2}" dt="2024-07-16T10:14:05.825" v="108" actId="1037"/>
+          <ac:spMkLst>
+            <pc:docMk/>
+            <pc:sldMk cId="19349701" sldId="263"/>
+            <ac:spMk id="7" creationId="{2B7E25EF-AEAB-D46F-394B-F805E54DA742}"/>
+          </ac:spMkLst>
+        </pc:spChg>
+        <pc:spChg chg="add mod">
+          <ac:chgData name="BOUCADAIR Mohamed INNOV/NET" userId="2acbca90-6db1-4111-98c4-832797dda751" providerId="ADAL" clId="{D2F81640-DBF7-4596-A85C-8BBE2BAACBF2}" dt="2024-07-16T10:15:03.546" v="116" actId="207"/>
+          <ac:spMkLst>
+            <pc:docMk/>
+            <pc:sldMk cId="19349701" sldId="263"/>
+            <ac:spMk id="8" creationId="{43CBEF85-868C-DB6D-8E15-BC44095515A0}"/>
           </ac:spMkLst>
         </pc:spChg>
       </pc:sldChg>
-      <pc:sldChg chg="addSp modSp mod">
-        <pc:chgData name="BOUCADAIR Mohamed INNOV/NET" userId="2acbca90-6db1-4111-98c4-832797dda751" providerId="ADAL" clId="{59F6FDA4-2B5F-4B5B-B88E-9904D84ED0E1}" dt="2024-07-25T10:26:22.246" v="567"/>
-        <pc:sldMkLst>
-          <pc:docMk/>
-          <pc:sldMk cId="3664032414" sldId="270"/>
-        </pc:sldMkLst>
-        <pc:spChg chg="add mod">
-          <ac:chgData name="BOUCADAIR Mohamed INNOV/NET" userId="2acbca90-6db1-4111-98c4-832797dda751" providerId="ADAL" clId="{59F6FDA4-2B5F-4B5B-B88E-9904D84ED0E1}" dt="2024-07-25T10:26:22.246" v="567"/>
-          <ac:spMkLst>
-            <pc:docMk/>
-            <pc:sldMk cId="3664032414" sldId="270"/>
-            <ac:spMk id="3" creationId="{FB0EA3CF-BB8A-1C4E-7A3A-DC28DBA68DD9}"/>
-          </ac:spMkLst>
-        </pc:spChg>
-      </pc:sldChg>
-      <pc:sldChg chg="modSp mod">
-        <pc:chgData name="BOUCADAIR Mohamed INNOV/NET" userId="2acbca90-6db1-4111-98c4-832797dda751" providerId="ADAL" clId="{59F6FDA4-2B5F-4B5B-B88E-9904D84ED0E1}" dt="2024-07-25T10:26:31.140" v="569"/>
+      <pc:sldChg chg="addSp delSp modSp mod">
+        <pc:chgData name="BOUCADAIR Mohamed INNOV/NET" userId="2acbca90-6db1-4111-98c4-832797dda751" providerId="ADAL" clId="{D2F81640-DBF7-4596-A85C-8BBE2BAACBF2}" dt="2024-07-16T10:18:13.267" v="236" actId="20577"/>
         <pc:sldMkLst>
           <pc:docMk/>
           <pc:sldMk cId="514278596" sldId="274"/>
         </pc:sldMkLst>
         <pc:spChg chg="mod">
-          <ac:chgData name="BOUCADAIR Mohamed INNOV/NET" userId="2acbca90-6db1-4111-98c4-832797dda751" providerId="ADAL" clId="{59F6FDA4-2B5F-4B5B-B88E-9904D84ED0E1}" dt="2024-07-25T10:26:31.140" v="569"/>
+          <ac:chgData name="BOUCADAIR Mohamed INNOV/NET" userId="2acbca90-6db1-4111-98c4-832797dda751" providerId="ADAL" clId="{D2F81640-DBF7-4596-A85C-8BBE2BAACBF2}" dt="2024-07-16T10:18:13.267" v="236" actId="20577"/>
           <ac:spMkLst>
             <pc:docMk/>
             <pc:sldMk cId="514278596" sldId="274"/>
             <ac:spMk id="5" creationId="{3856129A-94B9-0425-E3E2-66E6DE494147}"/>
           </ac:spMkLst>
         </pc:spChg>
-      </pc:sldChg>
-      <pc:sldChg chg="addSp delSp modSp new del mod">
-        <pc:chgData name="BOUCADAIR Mohamed INNOV/NET" userId="2acbca90-6db1-4111-98c4-832797dda751" providerId="ADAL" clId="{59F6FDA4-2B5F-4B5B-B88E-9904D84ED0E1}" dt="2024-07-25T10:24:29.805" v="528" actId="47"/>
-        <pc:sldMkLst>
-          <pc:docMk/>
-          <pc:sldMk cId="1210538029" sldId="276"/>
-        </pc:sldMkLst>
-        <pc:spChg chg="mod">
-          <ac:chgData name="BOUCADAIR Mohamed INNOV/NET" userId="2acbca90-6db1-4111-98c4-832797dda751" providerId="ADAL" clId="{59F6FDA4-2B5F-4B5B-B88E-9904D84ED0E1}" dt="2024-07-25T10:22:05.753" v="475" actId="20577"/>
-          <ac:spMkLst>
-            <pc:docMk/>
-            <pc:sldMk cId="1210538029" sldId="276"/>
-            <ac:spMk id="2" creationId="{8D0A9E63-A403-35AB-D257-445F2EB3A880}"/>
-          </ac:spMkLst>
-        </pc:spChg>
-        <pc:spChg chg="del">
-          <ac:chgData name="BOUCADAIR Mohamed INNOV/NET" userId="2acbca90-6db1-4111-98c4-832797dda751" providerId="ADAL" clId="{59F6FDA4-2B5F-4B5B-B88E-9904D84ED0E1}" dt="2024-07-25T10:21:46.178" v="467" actId="478"/>
-          <ac:spMkLst>
-            <pc:docMk/>
-            <pc:sldMk cId="1210538029" sldId="276"/>
-            <ac:spMk id="3" creationId="{63CE1D58-85E9-DF46-42CD-DDE5467A2C8D}"/>
-          </ac:spMkLst>
-        </pc:spChg>
-        <pc:spChg chg="add mod">
-          <ac:chgData name="BOUCADAIR Mohamed INNOV/NET" userId="2acbca90-6db1-4111-98c4-832797dda751" providerId="ADAL" clId="{59F6FDA4-2B5F-4B5B-B88E-9904D84ED0E1}" dt="2024-07-25T10:22:39.318" v="482" actId="208"/>
-          <ac:spMkLst>
-            <pc:docMk/>
-            <pc:sldMk cId="1210538029" sldId="276"/>
-            <ac:spMk id="7" creationId="{D1B45DFC-0642-CD92-0761-37A3232DD028}"/>
-          </ac:spMkLst>
-        </pc:spChg>
-        <pc:spChg chg="add mod">
-          <ac:chgData name="BOUCADAIR Mohamed INNOV/NET" userId="2acbca90-6db1-4111-98c4-832797dda751" providerId="ADAL" clId="{59F6FDA4-2B5F-4B5B-B88E-9904D84ED0E1}" dt="2024-07-25T10:22:45.686" v="483" actId="1076"/>
-          <ac:spMkLst>
-            <pc:docMk/>
-            <pc:sldMk cId="1210538029" sldId="276"/>
-            <ac:spMk id="8" creationId="{322AA1CE-42C4-221C-C03C-3ADDE5E9428A}"/>
-          </ac:spMkLst>
-        </pc:spChg>
-        <pc:spChg chg="add mod">
-          <ac:chgData name="BOUCADAIR Mohamed INNOV/NET" userId="2acbca90-6db1-4111-98c4-832797dda751" providerId="ADAL" clId="{59F6FDA4-2B5F-4B5B-B88E-9904D84ED0E1}" dt="2024-07-25T10:24:21.471" v="527" actId="14100"/>
-          <ac:spMkLst>
-            <pc:docMk/>
-            <pc:sldMk cId="1210538029" sldId="276"/>
-            <ac:spMk id="9" creationId="{AE3EC158-B6C2-83CD-C9E4-0C689DEC06B5}"/>
-          </ac:spMkLst>
-        </pc:spChg>
-        <pc:picChg chg="add mod">
-          <ac:chgData name="BOUCADAIR Mohamed INNOV/NET" userId="2acbca90-6db1-4111-98c4-832797dda751" providerId="ADAL" clId="{59F6FDA4-2B5F-4B5B-B88E-9904D84ED0E1}" dt="2024-07-25T10:22:03.394" v="473" actId="1076"/>
-          <ac:picMkLst>
-            <pc:docMk/>
-            <pc:sldMk cId="1210538029" sldId="276"/>
-            <ac:picMk id="6" creationId="{841BE516-3EF8-8CC1-7182-2872E92DC3D4}"/>
-          </ac:picMkLst>
-        </pc:picChg>
-      </pc:sldChg>
-    </pc:docChg>
-  </pc:docChgLst>
-  <pc:docChgLst>
-    <pc:chgData name="BOUCADAIR Mohamed INNOV/NET" userId="2acbca90-6db1-4111-98c4-832797dda751" providerId="ADAL" clId="{91DE2053-694C-444E-9F1C-8B0299126E9C}"/>
-    <pc:docChg chg="modSld">
-      <pc:chgData name="BOUCADAIR Mohamed INNOV/NET" userId="2acbca90-6db1-4111-98c4-832797dda751" providerId="ADAL" clId="{91DE2053-694C-444E-9F1C-8B0299126E9C}" dt="2024-07-09T13:47:56.045" v="3" actId="114"/>
-      <pc:docMkLst>
-        <pc:docMk/>
-      </pc:docMkLst>
-      <pc:sldChg chg="modSp mod">
-        <pc:chgData name="BOUCADAIR Mohamed INNOV/NET" userId="2acbca90-6db1-4111-98c4-832797dda751" providerId="ADAL" clId="{91DE2053-694C-444E-9F1C-8B0299126E9C}" dt="2024-07-09T13:47:39.975" v="0" actId="6549"/>
-        <pc:sldMkLst>
-          <pc:docMk/>
-          <pc:sldMk cId="2749868532" sldId="268"/>
-        </pc:sldMkLst>
-        <pc:spChg chg="mod">
-          <ac:chgData name="BOUCADAIR Mohamed INNOV/NET" userId="2acbca90-6db1-4111-98c4-832797dda751" providerId="ADAL" clId="{91DE2053-694C-444E-9F1C-8B0299126E9C}" dt="2024-07-09T13:47:39.975" v="0" actId="6549"/>
-          <ac:spMkLst>
-            <pc:docMk/>
-            <pc:sldMk cId="2749868532" sldId="268"/>
-            <ac:spMk id="9" creationId="{BB4F778F-8939-B422-821F-330027B1D08E}"/>
-          </ac:spMkLst>
-        </pc:spChg>
-      </pc:sldChg>
-      <pc:sldChg chg="modSp mod">
-        <pc:chgData name="BOUCADAIR Mohamed INNOV/NET" userId="2acbca90-6db1-4111-98c4-832797dda751" providerId="ADAL" clId="{91DE2053-694C-444E-9F1C-8B0299126E9C}" dt="2024-07-09T13:47:56.045" v="3" actId="114"/>
-        <pc:sldMkLst>
-          <pc:docMk/>
-          <pc:sldMk cId="1331798219" sldId="273"/>
-        </pc:sldMkLst>
-        <pc:spChg chg="mod">
-          <ac:chgData name="BOUCADAIR Mohamed INNOV/NET" userId="2acbca90-6db1-4111-98c4-832797dda751" providerId="ADAL" clId="{91DE2053-694C-444E-9F1C-8B0299126E9C}" dt="2024-07-09T13:47:56.045" v="3" actId="114"/>
-          <ac:spMkLst>
-            <pc:docMk/>
-            <pc:sldMk cId="1331798219" sldId="273"/>
-            <ac:spMk id="3" creationId="{6442B71D-4950-F917-F8CB-D32A0312F531}"/>
-          </ac:spMkLst>
-        </pc:spChg>
-      </pc:sldChg>
-      <pc:sldChg chg="modSp mod">
-        <pc:chgData name="BOUCADAIR Mohamed INNOV/NET" userId="2acbca90-6db1-4111-98c4-832797dda751" providerId="ADAL" clId="{91DE2053-694C-444E-9F1C-8B0299126E9C}" dt="2024-07-09T13:47:44.805" v="2" actId="20577"/>
-        <pc:sldMkLst>
-          <pc:docMk/>
-          <pc:sldMk cId="514278596" sldId="274"/>
-        </pc:sldMkLst>
-        <pc:spChg chg="mod">
-          <ac:chgData name="BOUCADAIR Mohamed INNOV/NET" userId="2acbca90-6db1-4111-98c4-832797dda751" providerId="ADAL" clId="{91DE2053-694C-444E-9F1C-8B0299126E9C}" dt="2024-07-09T13:47:44.805" v="2" actId="20577"/>
+        <pc:spChg chg="add del mod">
+          <ac:chgData name="BOUCADAIR Mohamed INNOV/NET" userId="2acbca90-6db1-4111-98c4-832797dda751" providerId="ADAL" clId="{D2F81640-DBF7-4596-A85C-8BBE2BAACBF2}" dt="2024-07-16T10:17:47.377" v="230" actId="478"/>
           <ac:spMkLst>
             <pc:docMk/>
             <pc:sldMk cId="514278596" sldId="274"/>
-            <ac:spMk id="5" creationId="{3856129A-94B9-0425-E3E2-66E6DE494147}"/>
+            <ac:spMk id="6" creationId="{2AF546A0-30B2-8592-4398-B35176E22E58}"/>
+          </ac:spMkLst>
+        </pc:spChg>
+        <pc:spChg chg="add del mod">
+          <ac:chgData name="BOUCADAIR Mohamed INNOV/NET" userId="2acbca90-6db1-4111-98c4-832797dda751" providerId="ADAL" clId="{D2F81640-DBF7-4596-A85C-8BBE2BAACBF2}" dt="2024-07-16T10:17:49.657" v="231" actId="478"/>
+          <ac:spMkLst>
+            <pc:docMk/>
+            <pc:sldMk cId="514278596" sldId="274"/>
+            <ac:spMk id="7" creationId="{DCD64453-FCEB-586A-5A4E-B232DB3AEA38}"/>
           </ac:spMkLst>
         </pc:spChg>
       </pc:sldChg>
@@ -1648,58 +1650,56 @@
     </pc:docChg>
   </pc:docChgLst>
   <pc:docChgLst>
-    <pc:chgData name="BOUCADAIR Mohamed INNOV/NET" userId="2acbca90-6db1-4111-98c4-832797dda751" providerId="ADAL" clId="{5E7AF159-790E-476D-B646-0EA162FC4C56}"/>
-    <pc:docChg chg="custSel modSld">
-      <pc:chgData name="BOUCADAIR Mohamed INNOV/NET" userId="2acbca90-6db1-4111-98c4-832797dda751" providerId="ADAL" clId="{5E7AF159-790E-476D-B646-0EA162FC4C56}" dt="2024-07-25T10:31:23.642" v="34" actId="207"/>
+    <pc:chgData name="BOUCADAIR Mohamed INNOV/NET" userId="2acbca90-6db1-4111-98c4-832797dda751" providerId="ADAL" clId="{91DE2053-694C-444E-9F1C-8B0299126E9C}"/>
+    <pc:docChg chg="modSld">
+      <pc:chgData name="BOUCADAIR Mohamed INNOV/NET" userId="2acbca90-6db1-4111-98c4-832797dda751" providerId="ADAL" clId="{91DE2053-694C-444E-9F1C-8B0299126E9C}" dt="2024-07-09T13:47:56.045" v="3" actId="114"/>
       <pc:docMkLst>
         <pc:docMk/>
       </pc:docMkLst>
-      <pc:sldChg chg="addSp delSp modSp mod">
-        <pc:chgData name="BOUCADAIR Mohamed INNOV/NET" userId="2acbca90-6db1-4111-98c4-832797dda751" providerId="ADAL" clId="{5E7AF159-790E-476D-B646-0EA162FC4C56}" dt="2024-07-25T10:31:23.642" v="34" actId="207"/>
+      <pc:sldChg chg="modSp mod">
+        <pc:chgData name="BOUCADAIR Mohamed INNOV/NET" userId="2acbca90-6db1-4111-98c4-832797dda751" providerId="ADAL" clId="{91DE2053-694C-444E-9F1C-8B0299126E9C}" dt="2024-07-09T13:47:39.975" v="0" actId="6549"/>
         <pc:sldMkLst>
           <pc:docMk/>
-          <pc:sldMk cId="513082138" sldId="271"/>
+          <pc:sldMk cId="2749868532" sldId="268"/>
         </pc:sldMkLst>
-        <pc:spChg chg="add del mod">
-          <ac:chgData name="BOUCADAIR Mohamed INNOV/NET" userId="2acbca90-6db1-4111-98c4-832797dda751" providerId="ADAL" clId="{5E7AF159-790E-476D-B646-0EA162FC4C56}" dt="2024-07-25T10:30:18.251" v="6" actId="478"/>
+        <pc:spChg chg="mod">
+          <ac:chgData name="BOUCADAIR Mohamed INNOV/NET" userId="2acbca90-6db1-4111-98c4-832797dda751" providerId="ADAL" clId="{91DE2053-694C-444E-9F1C-8B0299126E9C}" dt="2024-07-09T13:47:39.975" v="0" actId="6549"/>
           <ac:spMkLst>
             <pc:docMk/>
-            <pc:sldMk cId="513082138" sldId="271"/>
-            <ac:spMk id="7" creationId="{959513DF-7598-B39D-5374-43A00E7C1D11}"/>
+            <pc:sldMk cId="2749868532" sldId="268"/>
+            <ac:spMk id="9" creationId="{BB4F778F-8939-B422-821F-330027B1D08E}"/>
           </ac:spMkLst>
         </pc:spChg>
-        <pc:spChg chg="add mod">
-          <ac:chgData name="BOUCADAIR Mohamed INNOV/NET" userId="2acbca90-6db1-4111-98c4-832797dda751" providerId="ADAL" clId="{5E7AF159-790E-476D-B646-0EA162FC4C56}" dt="2024-07-25T10:31:06.040" v="19" actId="14100"/>
+      </pc:sldChg>
+      <pc:sldChg chg="modSp mod">
+        <pc:chgData name="BOUCADAIR Mohamed INNOV/NET" userId="2acbca90-6db1-4111-98c4-832797dda751" providerId="ADAL" clId="{91DE2053-694C-444E-9F1C-8B0299126E9C}" dt="2024-07-09T13:47:56.045" v="3" actId="114"/>
+        <pc:sldMkLst>
+          <pc:docMk/>
+          <pc:sldMk cId="1331798219" sldId="273"/>
+        </pc:sldMkLst>
+        <pc:spChg chg="mod">
+          <ac:chgData name="BOUCADAIR Mohamed INNOV/NET" userId="2acbca90-6db1-4111-98c4-832797dda751" providerId="ADAL" clId="{91DE2053-694C-444E-9F1C-8B0299126E9C}" dt="2024-07-09T13:47:56.045" v="3" actId="114"/>
           <ac:spMkLst>
             <pc:docMk/>
-            <pc:sldMk cId="513082138" sldId="271"/>
-            <ac:spMk id="8" creationId="{5DFD05E8-7913-434C-25CA-289688FED3CE}"/>
+            <pc:sldMk cId="1331798219" sldId="273"/>
+            <ac:spMk id="3" creationId="{6442B71D-4950-F917-F8CB-D32A0312F531}"/>
           </ac:spMkLst>
         </pc:spChg>
-        <pc:spChg chg="add mod">
-          <ac:chgData name="BOUCADAIR Mohamed INNOV/NET" userId="2acbca90-6db1-4111-98c4-832797dda751" providerId="ADAL" clId="{5E7AF159-790E-476D-B646-0EA162FC4C56}" dt="2024-07-25T10:31:23.642" v="34" actId="207"/>
+      </pc:sldChg>
+      <pc:sldChg chg="modSp mod">
+        <pc:chgData name="BOUCADAIR Mohamed INNOV/NET" userId="2acbca90-6db1-4111-98c4-832797dda751" providerId="ADAL" clId="{91DE2053-694C-444E-9F1C-8B0299126E9C}" dt="2024-07-09T13:47:44.805" v="2" actId="20577"/>
+        <pc:sldMkLst>
+          <pc:docMk/>
+          <pc:sldMk cId="514278596" sldId="274"/>
+        </pc:sldMkLst>
+        <pc:spChg chg="mod">
+          <ac:chgData name="BOUCADAIR Mohamed INNOV/NET" userId="2acbca90-6db1-4111-98c4-832797dda751" providerId="ADAL" clId="{91DE2053-694C-444E-9F1C-8B0299126E9C}" dt="2024-07-09T13:47:44.805" v="2" actId="20577"/>
           <ac:spMkLst>
             <pc:docMk/>
-            <pc:sldMk cId="513082138" sldId="271"/>
-            <ac:spMk id="9" creationId="{2328023F-1C93-51F0-A761-742333E90631}"/>
+            <pc:sldMk cId="514278596" sldId="274"/>
+            <ac:spMk id="5" creationId="{3856129A-94B9-0425-E3E2-66E6DE494147}"/>
           </ac:spMkLst>
         </pc:spChg>
-        <pc:picChg chg="add mod">
-          <ac:chgData name="BOUCADAIR Mohamed INNOV/NET" userId="2acbca90-6db1-4111-98c4-832797dda751" providerId="ADAL" clId="{5E7AF159-790E-476D-B646-0EA162FC4C56}" dt="2024-07-25T10:29:41.283" v="2" actId="1076"/>
-          <ac:picMkLst>
-            <pc:docMk/>
-            <pc:sldMk cId="513082138" sldId="271"/>
-            <ac:picMk id="5" creationId="{AF5338B3-82EF-B6E1-3E64-A69B18A3C63B}"/>
-          </ac:picMkLst>
-        </pc:picChg>
-        <pc:picChg chg="del">
-          <ac:chgData name="BOUCADAIR Mohamed INNOV/NET" userId="2acbca90-6db1-4111-98c4-832797dda751" providerId="ADAL" clId="{5E7AF159-790E-476D-B646-0EA162FC4C56}" dt="2024-07-25T10:29:38.004" v="0" actId="478"/>
-          <ac:picMkLst>
-            <pc:docMk/>
-            <pc:sldMk cId="513082138" sldId="271"/>
-            <ac:picMk id="6" creationId="{12D77918-8ECB-6E5D-0965-E81951B65AA8}"/>
-          </ac:picMkLst>
-        </pc:picChg>
       </pc:sldChg>
     </pc:docChg>
   </pc:docChgLst>
@@ -3217,7 +3217,7 @@
             </a:pPr>
             <a:fld id="{00000000-1234-1234-1234-123412341234}" type="slidenum">
               <a:rPr lang="en-US"/>
-              <a:t>‹N°›</a:t>
+              <a:t>‹#›</a:t>
             </a:fld>
             <a:endParaRPr/>
           </a:p>
@@ -3874,7 +3874,7 @@
             </a:pPr>
             <a:fld id="{00000000-1234-1234-1234-123412341234}" type="slidenum">
               <a:rPr lang="en-US"/>
-              <a:t>‹N°›</a:t>
+              <a:t>‹#›</a:t>
             </a:fld>
             <a:endParaRPr/>
           </a:p>
@@ -5110,7 +5110,7 @@
             </a:pPr>
             <a:fld id="{00000000-1234-1234-1234-123412341234}" type="slidenum">
               <a:rPr lang="en-US"/>
-              <a:t>‹N°›</a:t>
+              <a:t>‹#›</a:t>
             </a:fld>
             <a:endParaRPr/>
           </a:p>
@@ -6105,7 +6105,7 @@
             </a:pPr>
             <a:fld id="{00000000-1234-1234-1234-123412341234}" type="slidenum">
               <a:rPr lang="en-US"/>
-              <a:t>‹N°›</a:t>
+              <a:t>‹#›</a:t>
             </a:fld>
             <a:endParaRPr/>
           </a:p>
@@ -6679,7 +6679,7 @@
             </a:pPr>
             <a:fld id="{00000000-1234-1234-1234-123412341234}" type="slidenum">
               <a:rPr lang="en-US"/>
-              <a:t>‹N°›</a:t>
+              <a:t>‹#›</a:t>
             </a:fld>
             <a:endParaRPr/>
           </a:p>
@@ -7915,7 +7915,7 @@
             </a:pPr>
             <a:fld id="{00000000-1234-1234-1234-123412341234}" type="slidenum">
               <a:rPr lang="en-US"/>
-              <a:t>‹N°›</a:t>
+              <a:t>‹#›</a:t>
             </a:fld>
             <a:endParaRPr/>
           </a:p>
@@ -8407,7 +8407,7 @@
             </a:pPr>
             <a:fld id="{00000000-1234-1234-1234-123412341234}" type="slidenum">
               <a:rPr lang="en-US"/>
-              <a:t>‹N°›</a:t>
+              <a:t>‹#›</a:t>
             </a:fld>
             <a:endParaRPr/>
           </a:p>
@@ -9259,7 +9259,7 @@
             </a:pPr>
             <a:fld id="{00000000-1234-1234-1234-123412341234}" type="slidenum">
               <a:rPr lang="en-US"/>
-              <a:t>‹N°›</a:t>
+              <a:t>‹#›</a:t>
             </a:fld>
             <a:endParaRPr/>
           </a:p>
@@ -10235,7 +10235,7 @@
             </a:pPr>
             <a:fld id="{00000000-1234-1234-1234-123412341234}" type="slidenum">
               <a:rPr lang="en-US"/>
-              <a:t>‹N°›</a:t>
+              <a:t>‹#›</a:t>
             </a:fld>
             <a:endParaRPr/>
           </a:p>
@@ -10529,7 +10529,7 @@
             </a:pPr>
             <a:fld id="{00000000-1234-1234-1234-123412341234}" type="slidenum">
               <a:rPr lang="en-US"/>
-              <a:t>‹N°›</a:t>
+              <a:t>‹#›</a:t>
             </a:fld>
             <a:endParaRPr/>
           </a:p>
@@ -11737,7 +11737,7 @@
             </a:pPr>
             <a:fld id="{00000000-1234-1234-1234-123412341234}" type="slidenum">
               <a:rPr lang="en-US"/>
-              <a:t>‹N°›</a:t>
+              <a:t>‹#›</a:t>
             </a:fld>
             <a:endParaRPr/>
           </a:p>
@@ -12643,7 +12643,7 @@
             </a:pPr>
             <a:fld id="{00000000-1234-1234-1234-123412341234}" type="slidenum">
               <a:rPr lang="en-US"/>
-              <a:t>‹N°›</a:t>
+              <a:t>‹#›</a:t>
             </a:fld>
             <a:endParaRPr/>
           </a:p>
@@ -13368,7 +13368,7 @@
             </a:pPr>
             <a:fld id="{00000000-1234-1234-1234-123412341234}" type="slidenum">
               <a:rPr lang="en-US"/>
-              <a:t>‹N°›</a:t>
+              <a:t>‹#›</a:t>
             </a:fld>
             <a:endParaRPr/>
           </a:p>
@@ -14237,7 +14237,7 @@
             </a:pPr>
             <a:fld id="{00000000-1234-1234-1234-123412341234}" type="slidenum">
               <a:rPr lang="en-US"/>
-              <a:t>‹N°›</a:t>
+              <a:t>‹#›</a:t>
             </a:fld>
             <a:endParaRPr/>
           </a:p>
@@ -15354,7 +15354,7 @@
             </a:pPr>
             <a:fld id="{00000000-1234-1234-1234-123412341234}" type="slidenum">
               <a:rPr lang="en-US"/>
-              <a:t>‹N°›</a:t>
+              <a:t>‹#›</a:t>
             </a:fld>
             <a:endParaRPr/>
           </a:p>
@@ -15695,7 +15695,7 @@
             </a:pPr>
             <a:fld id="{00000000-1234-1234-1234-123412341234}" type="slidenum">
               <a:rPr lang="en-US"/>
-              <a:t>‹N°›</a:t>
+              <a:t>‹#›</a:t>
             </a:fld>
             <a:endParaRPr/>
           </a:p>
@@ -17777,7 +17777,7 @@
             </a:pPr>
             <a:fld id="{00000000-1234-1234-1234-123412341234}" type="slidenum">
               <a:rPr lang="en-US"/>
-              <a:t>‹N°›</a:t>
+              <a:t>‹#›</a:t>
             </a:fld>
             <a:endParaRPr/>
           </a:p>
@@ -18865,6 +18865,10 @@
           <a:lstStyle/>
           <a:p>
             <a:r>
+              <a:rPr lang="fr-FR" dirty="0"/>
+              <a:t>Digital </a:t>
+            </a:r>
+            <a:r>
               <a:rPr lang="fr-FR" dirty="0" err="1"/>
               <a:t>Map</a:t>
             </a:r>
@@ -20441,7 +20445,7 @@
         <p:fade/>
       </p:transition>
     </mc:Choice>
-    <mc:Fallback xmlns="" xmlns:mv="urn:schemas-microsoft-com:mac:vml" xmlns:c="http://schemas.openxmlformats.org/drawingml/2006/chart" xmlns:dgm="http://schemas.openxmlformats.org/drawingml/2006/diagram" xmlns:o="urn:schemas-microsoft-com:office:office" xmlns:v="urn:schemas-microsoft-com:vml" xmlns:pvml="urn:schemas-microsoft-com:office:powerpoint" xmlns:com="http://schemas.openxmlformats.org/drawingml/2006/compatibility" xmlns:p15="http://schemas.microsoft.com/office/powerpoint/2012/main" xmlns:ahyp="http://schemas.microsoft.com/office/drawing/2018/hyperlinkcolor">
+    <mc:Fallback xmlns:ahyp="http://schemas.microsoft.com/office/drawing/2018/hyperlinkcolor" xmlns:p15="http://schemas.microsoft.com/office/powerpoint/2012/main" xmlns:com="http://schemas.openxmlformats.org/drawingml/2006/compatibility" xmlns:pvml="urn:schemas-microsoft-com:office:powerpoint" xmlns:v="urn:schemas-microsoft-com:vml" xmlns:o="urn:schemas-microsoft-com:office:office" xmlns:dgm="http://schemas.openxmlformats.org/drawingml/2006/diagram" xmlns:c="http://schemas.openxmlformats.org/drawingml/2006/chart" xmlns:mv="urn:schemas-microsoft-com:mac:vml" xmlns="">
       <p:transition spd="slow">
         <p:fade/>
       </p:transition>
@@ -20776,7 +20780,7 @@
         <p:fade/>
       </p:transition>
     </mc:Choice>
-    <mc:Fallback xmlns="" xmlns:mv="urn:schemas-microsoft-com:mac:vml" xmlns:c="http://schemas.openxmlformats.org/drawingml/2006/chart" xmlns:dgm="http://schemas.openxmlformats.org/drawingml/2006/diagram" xmlns:o="urn:schemas-microsoft-com:office:office" xmlns:v="urn:schemas-microsoft-com:vml" xmlns:pvml="urn:schemas-microsoft-com:office:powerpoint" xmlns:com="http://schemas.openxmlformats.org/drawingml/2006/compatibility" xmlns:p15="http://schemas.microsoft.com/office/powerpoint/2012/main" xmlns:ahyp="http://schemas.microsoft.com/office/drawing/2018/hyperlinkcolor">
+    <mc:Fallback xmlns:ahyp="http://schemas.microsoft.com/office/drawing/2018/hyperlinkcolor" xmlns:p15="http://schemas.microsoft.com/office/powerpoint/2012/main" xmlns:com="http://schemas.openxmlformats.org/drawingml/2006/compatibility" xmlns:pvml="urn:schemas-microsoft-com:office:powerpoint" xmlns:v="urn:schemas-microsoft-com:vml" xmlns:o="urn:schemas-microsoft-com:office:office" xmlns:dgm="http://schemas.openxmlformats.org/drawingml/2006/diagram" xmlns:c="http://schemas.openxmlformats.org/drawingml/2006/chart" xmlns:mv="urn:schemas-microsoft-com:mac:vml" xmlns="">
       <p:transition spd="slow">
         <p:fade/>
       </p:transition>
@@ -22382,7 +22386,7 @@
             </a:solidFill>
             <a:extLst>
               <a:ext uri="{C807C97D-BFC1-408E-A445-0C87EB9F89A2}">
-                <ask:lineSketchStyleProps xmlns:ask="http://schemas.microsoft.com/office/drawing/2018/sketchyshapes" sd="3608884092">
+                <ask:lineSketchStyleProps xmlns:ask="http://schemas.microsoft.com/office/drawing/2018/sketchyshapes" xmlns="" sd="3608884092">
                   <a:prstGeom prst="rect">
                     <a:avLst/>
                   </a:prstGeom>
@@ -22515,7 +22519,7 @@
         </p:nvSpPr>
         <p:spPr>
           <a:xfrm>
-            <a:off x="7067907" y="3718730"/>
+            <a:off x="7358761" y="3686945"/>
             <a:ext cx="1764927" cy="307777"/>
           </a:xfrm>
           <a:prstGeom prst="rect">
@@ -22536,22 +22540,6 @@
                 </a:solidFill>
               </a:rPr>
               <a:t>Anomaly</a:t>
-            </a:r>
-            <a:r>
-              <a:rPr lang="fr-FR" dirty="0">
-                <a:solidFill>
-                  <a:srgbClr val="00B0F0"/>
-                </a:solidFill>
-              </a:rPr>
-              <a:t> </a:t>
-            </a:r>
-            <a:r>
-              <a:rPr lang="fr-FR" dirty="0" err="1">
-                <a:solidFill>
-                  <a:srgbClr val="00B0F0"/>
-                </a:solidFill>
-              </a:rPr>
-              <a:t>detection</a:t>
             </a:r>
             <a:endParaRPr lang="fr-FR" dirty="0">
               <a:solidFill>
@@ -22625,8 +22613,21 @@
                   <a:srgbClr val="00B0F0"/>
                 </a:solidFill>
               </a:rPr>
-              <a:t>Topologies</a:t>
+              <a:t>Digital </a:t>
             </a:r>
+            <a:r>
+              <a:rPr lang="fr-FR" dirty="0" err="1">
+                <a:solidFill>
+                  <a:srgbClr val="00B0F0"/>
+                </a:solidFill>
+              </a:rPr>
+              <a:t>Map</a:t>
+            </a:r>
+            <a:endParaRPr lang="fr-FR" dirty="0">
+              <a:solidFill>
+                <a:srgbClr val="00B0F0"/>
+              </a:solidFill>
+            </a:endParaRPr>
           </a:p>
         </p:txBody>
       </p:sp>
@@ -22645,7 +22646,7 @@
         <p:spPr>
           <a:xfrm>
             <a:off x="6274535" y="3754957"/>
-            <a:ext cx="833718" cy="235324"/>
+            <a:ext cx="1084226" cy="235324"/>
           </a:xfrm>
           <a:prstGeom prst="leftArrow">
             <a:avLst/>

</xml_diff>